<commit_message>
Final Submission: Robustness Diagrams
</commit_message>
<xml_diff>
--- a/Analysis/F1_Robustness_Analysis.pptx
+++ b/Analysis/F1_Robustness_Analysis.pptx
@@ -3321,7 +3321,7 @@
         <p:spPr>
           <a:xfrm>
             <a:off x="914400" y="1828800"/>
-            <a:ext cx="13107629" cy="4114800"/>
+            <a:ext cx="14328321" cy="4114800"/>
           </a:xfrm>
           <a:prstGeom prst="rect">
             <a:avLst/>
@@ -3384,7 +3384,7 @@
         <p:spPr>
           <a:xfrm>
             <a:off x="914400" y="1828800"/>
-            <a:ext cx="22997160" cy="4114800"/>
+            <a:ext cx="28317825" cy="4114800"/>
           </a:xfrm>
           <a:prstGeom prst="rect">
             <a:avLst/>
@@ -3447,7 +3447,7 @@
         <p:spPr>
           <a:xfrm>
             <a:off x="914400" y="1828800"/>
-            <a:ext cx="18101991" cy="4114800"/>
+            <a:ext cx="20700888" cy="4114800"/>
           </a:xfrm>
           <a:prstGeom prst="rect">
             <a:avLst/>
@@ -3510,7 +3510,7 @@
         <p:spPr>
           <a:xfrm>
             <a:off x="914400" y="1828800"/>
-            <a:ext cx="16349681" cy="4114800"/>
+            <a:ext cx="18670678" cy="4114800"/>
           </a:xfrm>
           <a:prstGeom prst="rect">
             <a:avLst/>
@@ -3573,7 +3573,7 @@
         <p:spPr>
           <a:xfrm>
             <a:off x="914400" y="1828800"/>
-            <a:ext cx="15106584" cy="4114800"/>
+            <a:ext cx="17012177" cy="4114800"/>
           </a:xfrm>
           <a:prstGeom prst="rect">
             <a:avLst/>

</xml_diff>